<commit_message>
successfully retrying PK collisions!
</commit_message>
<xml_diff>
--- a/presentations/FSharpETLDemo.pptx
+++ b/presentations/FSharpETLDemo.pptx
@@ -11,9 +11,12 @@
     <p:sldId id="259" r:id="rId5"/>
     <p:sldId id="261" r:id="rId6"/>
     <p:sldId id="260" r:id="rId7"/>
-    <p:sldId id="262" r:id="rId8"/>
-    <p:sldId id="263" r:id="rId9"/>
-    <p:sldId id="264" r:id="rId10"/>
+    <p:sldId id="267" r:id="rId8"/>
+    <p:sldId id="262" r:id="rId9"/>
+    <p:sldId id="263" r:id="rId10"/>
+    <p:sldId id="264" r:id="rId11"/>
+    <p:sldId id="265" r:id="rId12"/>
+    <p:sldId id="266" r:id="rId13"/>
   </p:sldIdLst>
   <p:sldSz cx="12192000" cy="6858000"/>
   <p:notesSz cx="6858000" cy="9144000"/>
@@ -112,6 +115,11 @@
       </a:defRPr>
     </a:lvl9pPr>
   </p:defaultTextStyle>
+  <p:extLst>
+    <p:ext uri="{EFAFB233-063F-42B5-8137-9DF3F51BA10A}">
+      <p15:sldGuideLst xmlns:p15="http://schemas.microsoft.com/office/powerpoint/2012/main"/>
+    </p:ext>
+  </p:extLst>
 </p:presentation>
 </file>
 
@@ -246,7 +254,7 @@
           <a:p>
             <a:fld id="{E3E23F6F-70BB-4CE2-BC6C-175C09BC2746}" type="datetimeFigureOut">
               <a:rPr lang="en-US" smtClean="0"/>
-              <a:t>1/13/2020</a:t>
+              <a:t>1/14/2020</a:t>
             </a:fld>
             <a:endParaRPr lang="en-US"/>
           </a:p>
@@ -416,7 +424,7 @@
           <a:p>
             <a:fld id="{E3E23F6F-70BB-4CE2-BC6C-175C09BC2746}" type="datetimeFigureOut">
               <a:rPr lang="en-US" smtClean="0"/>
-              <a:t>1/13/2020</a:t>
+              <a:t>1/14/2020</a:t>
             </a:fld>
             <a:endParaRPr lang="en-US"/>
           </a:p>
@@ -596,7 +604,7 @@
           <a:p>
             <a:fld id="{E3E23F6F-70BB-4CE2-BC6C-175C09BC2746}" type="datetimeFigureOut">
               <a:rPr lang="en-US" smtClean="0"/>
-              <a:t>1/13/2020</a:t>
+              <a:t>1/14/2020</a:t>
             </a:fld>
             <a:endParaRPr lang="en-US"/>
           </a:p>
@@ -766,7 +774,7 @@
           <a:p>
             <a:fld id="{E3E23F6F-70BB-4CE2-BC6C-175C09BC2746}" type="datetimeFigureOut">
               <a:rPr lang="en-US" smtClean="0"/>
-              <a:t>1/13/2020</a:t>
+              <a:t>1/14/2020</a:t>
             </a:fld>
             <a:endParaRPr lang="en-US"/>
           </a:p>
@@ -1012,7 +1020,7 @@
           <a:p>
             <a:fld id="{E3E23F6F-70BB-4CE2-BC6C-175C09BC2746}" type="datetimeFigureOut">
               <a:rPr lang="en-US" smtClean="0"/>
-              <a:t>1/13/2020</a:t>
+              <a:t>1/14/2020</a:t>
             </a:fld>
             <a:endParaRPr lang="en-US"/>
           </a:p>
@@ -1244,7 +1252,7 @@
           <a:p>
             <a:fld id="{E3E23F6F-70BB-4CE2-BC6C-175C09BC2746}" type="datetimeFigureOut">
               <a:rPr lang="en-US" smtClean="0"/>
-              <a:t>1/13/2020</a:t>
+              <a:t>1/14/2020</a:t>
             </a:fld>
             <a:endParaRPr lang="en-US"/>
           </a:p>
@@ -1611,7 +1619,7 @@
           <a:p>
             <a:fld id="{E3E23F6F-70BB-4CE2-BC6C-175C09BC2746}" type="datetimeFigureOut">
               <a:rPr lang="en-US" smtClean="0"/>
-              <a:t>1/13/2020</a:t>
+              <a:t>1/14/2020</a:t>
             </a:fld>
             <a:endParaRPr lang="en-US"/>
           </a:p>
@@ -1729,7 +1737,7 @@
           <a:p>
             <a:fld id="{E3E23F6F-70BB-4CE2-BC6C-175C09BC2746}" type="datetimeFigureOut">
               <a:rPr lang="en-US" smtClean="0"/>
-              <a:t>1/13/2020</a:t>
+              <a:t>1/14/2020</a:t>
             </a:fld>
             <a:endParaRPr lang="en-US"/>
           </a:p>
@@ -1824,7 +1832,7 @@
           <a:p>
             <a:fld id="{E3E23F6F-70BB-4CE2-BC6C-175C09BC2746}" type="datetimeFigureOut">
               <a:rPr lang="en-US" smtClean="0"/>
-              <a:t>1/13/2020</a:t>
+              <a:t>1/14/2020</a:t>
             </a:fld>
             <a:endParaRPr lang="en-US"/>
           </a:p>
@@ -2101,7 +2109,7 @@
           <a:p>
             <a:fld id="{E3E23F6F-70BB-4CE2-BC6C-175C09BC2746}" type="datetimeFigureOut">
               <a:rPr lang="en-US" smtClean="0"/>
-              <a:t>1/13/2020</a:t>
+              <a:t>1/14/2020</a:t>
             </a:fld>
             <a:endParaRPr lang="en-US"/>
           </a:p>
@@ -2358,7 +2366,7 @@
           <a:p>
             <a:fld id="{E3E23F6F-70BB-4CE2-BC6C-175C09BC2746}" type="datetimeFigureOut">
               <a:rPr lang="en-US" smtClean="0"/>
-              <a:t>1/13/2020</a:t>
+              <a:t>1/14/2020</a:t>
             </a:fld>
             <a:endParaRPr lang="en-US"/>
           </a:p>
@@ -2571,7 +2579,7 @@
           <a:p>
             <a:fld id="{E3E23F6F-70BB-4CE2-BC6C-175C09BC2746}" type="datetimeFigureOut">
               <a:rPr lang="en-US" smtClean="0"/>
-              <a:t>1/13/2020</a:t>
+              <a:t>1/14/2020</a:t>
             </a:fld>
             <a:endParaRPr lang="en-US"/>
           </a:p>
@@ -3038,6 +3046,610 @@
 </p:sld>
 </file>
 
+<file path=ppt/slides/slide10.xml><?xml version="1.0" encoding="utf-8"?>
+<p:sld xmlns:a="http://schemas.openxmlformats.org/drawingml/2006/main" xmlns:r="http://schemas.openxmlformats.org/officeDocument/2006/relationships" xmlns:p="http://schemas.openxmlformats.org/presentationml/2006/main">
+  <p:cSld>
+    <p:spTree>
+      <p:nvGrpSpPr>
+        <p:cNvPr id="1" name=""/>
+        <p:cNvGrpSpPr/>
+        <p:nvPr/>
+      </p:nvGrpSpPr>
+      <p:grpSpPr>
+        <a:xfrm>
+          <a:off x="0" y="0"/>
+          <a:ext cx="0" cy="0"/>
+          <a:chOff x="0" y="0"/>
+          <a:chExt cx="0" cy="0"/>
+        </a:xfrm>
+      </p:grpSpPr>
+      <p:sp>
+        <p:nvSpPr>
+          <p:cNvPr id="2" name="Title 1"/>
+          <p:cNvSpPr>
+            <a:spLocks noGrp="1"/>
+          </p:cNvSpPr>
+          <p:nvPr>
+            <p:ph type="title"/>
+          </p:nvPr>
+        </p:nvSpPr>
+        <p:spPr/>
+        <p:txBody>
+          <a:bodyPr/>
+          <a:lstStyle/>
+          <a:p>
+            <a:r>
+              <a:rPr lang="en-US" dirty="0" smtClean="0"/>
+              <a:t>Features coming soon</a:t>
+            </a:r>
+            <a:endParaRPr lang="en-US" dirty="0"/>
+          </a:p>
+        </p:txBody>
+      </p:sp>
+      <p:sp>
+        <p:nvSpPr>
+          <p:cNvPr id="3" name="Content Placeholder 2"/>
+          <p:cNvSpPr>
+            <a:spLocks noGrp="1"/>
+          </p:cNvSpPr>
+          <p:nvPr>
+            <p:ph idx="1"/>
+          </p:nvPr>
+        </p:nvSpPr>
+        <p:spPr>
+          <a:xfrm>
+            <a:off x="7317377" y="1690688"/>
+            <a:ext cx="6163491" cy="4953998"/>
+          </a:xfrm>
+        </p:spPr>
+        <p:txBody>
+          <a:bodyPr/>
+          <a:lstStyle/>
+          <a:p>
+            <a:r>
+              <a:rPr lang="en-US" dirty="0" smtClean="0"/>
+              <a:t>Unit Tests</a:t>
+            </a:r>
+            <a:endParaRPr lang="en-US" dirty="0"/>
+          </a:p>
+        </p:txBody>
+      </p:sp>
+      <p:sp>
+        <p:nvSpPr>
+          <p:cNvPr id="4" name="Content Placeholder 2"/>
+          <p:cNvSpPr txBox="1">
+            <a:spLocks/>
+          </p:cNvSpPr>
+          <p:nvPr/>
+        </p:nvSpPr>
+        <p:spPr>
+          <a:xfrm>
+            <a:off x="990600" y="1978025"/>
+            <a:ext cx="6163491" cy="4953998"/>
+          </a:xfrm>
+          <a:prstGeom prst="rect">
+            <a:avLst/>
+          </a:prstGeom>
+        </p:spPr>
+        <p:txBody>
+          <a:bodyPr vert="horz" lIns="91440" tIns="45720" rIns="91440" bIns="45720" rtlCol="0">
+            <a:normAutofit/>
+          </a:bodyPr>
+          <a:lstStyle>
+            <a:lvl1pPr marL="228600" indent="-228600" algn="l" defTabSz="914400" rtl="0" eaLnBrk="1" latinLnBrk="0" hangingPunct="1">
+              <a:lnSpc>
+                <a:spcPct val="90000"/>
+              </a:lnSpc>
+              <a:spcBef>
+                <a:spcPts val="1000"/>
+              </a:spcBef>
+              <a:buFont typeface="Arial" panose="020B0604020202020204" pitchFamily="34" charset="0"/>
+              <a:buChar char="•"/>
+              <a:defRPr sz="2800" kern="1200">
+                <a:solidFill>
+                  <a:schemeClr val="tx1"/>
+                </a:solidFill>
+                <a:latin typeface="+mn-lt"/>
+                <a:ea typeface="+mn-ea"/>
+                <a:cs typeface="+mn-cs"/>
+              </a:defRPr>
+            </a:lvl1pPr>
+            <a:lvl2pPr marL="685800" indent="-228600" algn="l" defTabSz="914400" rtl="0" eaLnBrk="1" latinLnBrk="0" hangingPunct="1">
+              <a:lnSpc>
+                <a:spcPct val="90000"/>
+              </a:lnSpc>
+              <a:spcBef>
+                <a:spcPts val="500"/>
+              </a:spcBef>
+              <a:buFont typeface="Arial" panose="020B0604020202020204" pitchFamily="34" charset="0"/>
+              <a:buChar char="•"/>
+              <a:defRPr sz="2400" kern="1200">
+                <a:solidFill>
+                  <a:schemeClr val="tx1"/>
+                </a:solidFill>
+                <a:latin typeface="+mn-lt"/>
+                <a:ea typeface="+mn-ea"/>
+                <a:cs typeface="+mn-cs"/>
+              </a:defRPr>
+            </a:lvl2pPr>
+            <a:lvl3pPr marL="1143000" indent="-228600" algn="l" defTabSz="914400" rtl="0" eaLnBrk="1" latinLnBrk="0" hangingPunct="1">
+              <a:lnSpc>
+                <a:spcPct val="90000"/>
+              </a:lnSpc>
+              <a:spcBef>
+                <a:spcPts val="500"/>
+              </a:spcBef>
+              <a:buFont typeface="Arial" panose="020B0604020202020204" pitchFamily="34" charset="0"/>
+              <a:buChar char="•"/>
+              <a:defRPr sz="2000" kern="1200">
+                <a:solidFill>
+                  <a:schemeClr val="tx1"/>
+                </a:solidFill>
+                <a:latin typeface="+mn-lt"/>
+                <a:ea typeface="+mn-ea"/>
+                <a:cs typeface="+mn-cs"/>
+              </a:defRPr>
+            </a:lvl3pPr>
+            <a:lvl4pPr marL="1600200" indent="-228600" algn="l" defTabSz="914400" rtl="0" eaLnBrk="1" latinLnBrk="0" hangingPunct="1">
+              <a:lnSpc>
+                <a:spcPct val="90000"/>
+              </a:lnSpc>
+              <a:spcBef>
+                <a:spcPts val="500"/>
+              </a:spcBef>
+              <a:buFont typeface="Arial" panose="020B0604020202020204" pitchFamily="34" charset="0"/>
+              <a:buChar char="•"/>
+              <a:defRPr sz="1800" kern="1200">
+                <a:solidFill>
+                  <a:schemeClr val="tx1"/>
+                </a:solidFill>
+                <a:latin typeface="+mn-lt"/>
+                <a:ea typeface="+mn-ea"/>
+                <a:cs typeface="+mn-cs"/>
+              </a:defRPr>
+            </a:lvl4pPr>
+            <a:lvl5pPr marL="2057400" indent="-228600" algn="l" defTabSz="914400" rtl="0" eaLnBrk="1" latinLnBrk="0" hangingPunct="1">
+              <a:lnSpc>
+                <a:spcPct val="90000"/>
+              </a:lnSpc>
+              <a:spcBef>
+                <a:spcPts val="500"/>
+              </a:spcBef>
+              <a:buFont typeface="Arial" panose="020B0604020202020204" pitchFamily="34" charset="0"/>
+              <a:buChar char="•"/>
+              <a:defRPr sz="1800" kern="1200">
+                <a:solidFill>
+                  <a:schemeClr val="tx1"/>
+                </a:solidFill>
+                <a:latin typeface="+mn-lt"/>
+                <a:ea typeface="+mn-ea"/>
+                <a:cs typeface="+mn-cs"/>
+              </a:defRPr>
+            </a:lvl5pPr>
+            <a:lvl6pPr marL="2514600" indent="-228600" algn="l" defTabSz="914400" rtl="0" eaLnBrk="1" latinLnBrk="0" hangingPunct="1">
+              <a:lnSpc>
+                <a:spcPct val="90000"/>
+              </a:lnSpc>
+              <a:spcBef>
+                <a:spcPts val="500"/>
+              </a:spcBef>
+              <a:buFont typeface="Arial" panose="020B0604020202020204" pitchFamily="34" charset="0"/>
+              <a:buChar char="•"/>
+              <a:defRPr sz="1800" kern="1200">
+                <a:solidFill>
+                  <a:schemeClr val="tx1"/>
+                </a:solidFill>
+                <a:latin typeface="+mn-lt"/>
+                <a:ea typeface="+mn-ea"/>
+                <a:cs typeface="+mn-cs"/>
+              </a:defRPr>
+            </a:lvl6pPr>
+            <a:lvl7pPr marL="2971800" indent="-228600" algn="l" defTabSz="914400" rtl="0" eaLnBrk="1" latinLnBrk="0" hangingPunct="1">
+              <a:lnSpc>
+                <a:spcPct val="90000"/>
+              </a:lnSpc>
+              <a:spcBef>
+                <a:spcPts val="500"/>
+              </a:spcBef>
+              <a:buFont typeface="Arial" panose="020B0604020202020204" pitchFamily="34" charset="0"/>
+              <a:buChar char="•"/>
+              <a:defRPr sz="1800" kern="1200">
+                <a:solidFill>
+                  <a:schemeClr val="tx1"/>
+                </a:solidFill>
+                <a:latin typeface="+mn-lt"/>
+                <a:ea typeface="+mn-ea"/>
+                <a:cs typeface="+mn-cs"/>
+              </a:defRPr>
+            </a:lvl7pPr>
+            <a:lvl8pPr marL="3429000" indent="-228600" algn="l" defTabSz="914400" rtl="0" eaLnBrk="1" latinLnBrk="0" hangingPunct="1">
+              <a:lnSpc>
+                <a:spcPct val="90000"/>
+              </a:lnSpc>
+              <a:spcBef>
+                <a:spcPts val="500"/>
+              </a:spcBef>
+              <a:buFont typeface="Arial" panose="020B0604020202020204" pitchFamily="34" charset="0"/>
+              <a:buChar char="•"/>
+              <a:defRPr sz="1800" kern="1200">
+                <a:solidFill>
+                  <a:schemeClr val="tx1"/>
+                </a:solidFill>
+                <a:latin typeface="+mn-lt"/>
+                <a:ea typeface="+mn-ea"/>
+                <a:cs typeface="+mn-cs"/>
+              </a:defRPr>
+            </a:lvl8pPr>
+            <a:lvl9pPr marL="3886200" indent="-228600" algn="l" defTabSz="914400" rtl="0" eaLnBrk="1" latinLnBrk="0" hangingPunct="1">
+              <a:lnSpc>
+                <a:spcPct val="90000"/>
+              </a:lnSpc>
+              <a:spcBef>
+                <a:spcPts val="500"/>
+              </a:spcBef>
+              <a:buFont typeface="Arial" panose="020B0604020202020204" pitchFamily="34" charset="0"/>
+              <a:buChar char="•"/>
+              <a:defRPr sz="1800" kern="1200">
+                <a:solidFill>
+                  <a:schemeClr val="tx1"/>
+                </a:solidFill>
+                <a:latin typeface="+mn-lt"/>
+                <a:ea typeface="+mn-ea"/>
+                <a:cs typeface="+mn-cs"/>
+              </a:defRPr>
+            </a:lvl9pPr>
+          </a:lstStyle>
+          <a:p>
+            <a:r>
+              <a:rPr lang="en-US" dirty="0" smtClean="0"/>
+              <a:t>Update status of input records</a:t>
+            </a:r>
+          </a:p>
+          <a:p>
+            <a:pPr lvl="1"/>
+            <a:r>
+              <a:rPr lang="en-US" dirty="0" smtClean="0"/>
+              <a:t>Delete successful records</a:t>
+            </a:r>
+          </a:p>
+          <a:p>
+            <a:pPr lvl="1"/>
+            <a:r>
+              <a:rPr lang="en-US" dirty="0" smtClean="0"/>
+              <a:t>Mark as failed if failed</a:t>
+            </a:r>
+          </a:p>
+          <a:p>
+            <a:pPr lvl="1"/>
+            <a:r>
+              <a:rPr lang="en-US" dirty="0" smtClean="0"/>
+              <a:t>Retry PK collisions</a:t>
+            </a:r>
+          </a:p>
+          <a:p>
+            <a:r>
+              <a:rPr lang="en-US" dirty="0" smtClean="0"/>
+              <a:t>Log to DB instead of console</a:t>
+            </a:r>
+          </a:p>
+          <a:p>
+            <a:r>
+              <a:rPr lang="en-US" dirty="0" smtClean="0"/>
+              <a:t>Multiple threads</a:t>
+            </a:r>
+          </a:p>
+          <a:p>
+            <a:r>
+              <a:rPr lang="en-US" dirty="0" smtClean="0"/>
+              <a:t>Better load test</a:t>
+            </a:r>
+          </a:p>
+          <a:p>
+            <a:pPr lvl="1"/>
+            <a:r>
+              <a:rPr lang="en-US" dirty="0" smtClean="0"/>
+              <a:t>10 instances: don’t always get PK collision</a:t>
+            </a:r>
+          </a:p>
+          <a:p>
+            <a:pPr lvl="1"/>
+            <a:r>
+              <a:rPr lang="en-US" dirty="0" smtClean="0"/>
+              <a:t>20 instances: timeout when loading input</a:t>
+            </a:r>
+          </a:p>
+          <a:p>
+            <a:r>
+              <a:rPr lang="en-US" dirty="0" smtClean="0"/>
+              <a:t>Code cleanup</a:t>
+            </a:r>
+            <a:endParaRPr lang="en-US" dirty="0"/>
+          </a:p>
+        </p:txBody>
+      </p:sp>
+    </p:spTree>
+    <p:extLst>
+      <p:ext uri="{BB962C8B-B14F-4D97-AF65-F5344CB8AC3E}">
+        <p14:creationId xmlns:p14="http://schemas.microsoft.com/office/powerpoint/2010/main" val="65708568"/>
+      </p:ext>
+    </p:extLst>
+  </p:cSld>
+  <p:clrMapOvr>
+    <a:masterClrMapping/>
+  </p:clrMapOvr>
+  <p:timing>
+    <p:tnLst>
+      <p:par>
+        <p:cTn id="1" dur="indefinite" restart="never" nodeType="tmRoot"/>
+      </p:par>
+    </p:tnLst>
+  </p:timing>
+</p:sld>
+</file>
+
+<file path=ppt/slides/slide11.xml><?xml version="1.0" encoding="utf-8"?>
+<p:sld xmlns:a="http://schemas.openxmlformats.org/drawingml/2006/main" xmlns:r="http://schemas.openxmlformats.org/officeDocument/2006/relationships" xmlns:p="http://schemas.openxmlformats.org/presentationml/2006/main">
+  <p:cSld>
+    <p:spTree>
+      <p:nvGrpSpPr>
+        <p:cNvPr id="1" name=""/>
+        <p:cNvGrpSpPr/>
+        <p:nvPr/>
+      </p:nvGrpSpPr>
+      <p:grpSpPr>
+        <a:xfrm>
+          <a:off x="0" y="0"/>
+          <a:ext cx="0" cy="0"/>
+          <a:chOff x="0" y="0"/>
+          <a:chExt cx="0" cy="0"/>
+        </a:xfrm>
+      </p:grpSpPr>
+      <p:sp>
+        <p:nvSpPr>
+          <p:cNvPr id="2" name="Title 1"/>
+          <p:cNvSpPr>
+            <a:spLocks noGrp="1"/>
+          </p:cNvSpPr>
+          <p:nvPr>
+            <p:ph type="title"/>
+          </p:nvPr>
+        </p:nvSpPr>
+        <p:spPr/>
+        <p:txBody>
+          <a:bodyPr/>
+          <a:lstStyle/>
+          <a:p>
+            <a:r>
+              <a:rPr lang="en-US" dirty="0" smtClean="0"/>
+              <a:t>Conclusion</a:t>
+            </a:r>
+            <a:endParaRPr lang="en-US" dirty="0"/>
+          </a:p>
+        </p:txBody>
+      </p:sp>
+      <p:sp>
+        <p:nvSpPr>
+          <p:cNvPr id="3" name="Content Placeholder 2"/>
+          <p:cNvSpPr>
+            <a:spLocks noGrp="1"/>
+          </p:cNvSpPr>
+          <p:nvPr>
+            <p:ph idx="1"/>
+          </p:nvPr>
+        </p:nvSpPr>
+        <p:spPr/>
+        <p:txBody>
+          <a:bodyPr/>
+          <a:lstStyle/>
+          <a:p>
+            <a:r>
+              <a:rPr lang="en-US" dirty="0" smtClean="0"/>
+              <a:t>FP is worth the learning curve</a:t>
+            </a:r>
+          </a:p>
+          <a:p>
+            <a:pPr lvl="1"/>
+            <a:r>
+              <a:rPr lang="en-US" dirty="0" smtClean="0"/>
+              <a:t>Way better tutorials than 10 years ago</a:t>
+            </a:r>
+          </a:p>
+          <a:p>
+            <a:pPr lvl="1"/>
+            <a:endParaRPr lang="en-US" dirty="0"/>
+          </a:p>
+          <a:p>
+            <a:r>
+              <a:rPr lang="en-US" dirty="0" smtClean="0"/>
+              <a:t>FP really does lead to less bugs</a:t>
+            </a:r>
+          </a:p>
+          <a:p>
+            <a:pPr lvl="1"/>
+            <a:r>
+              <a:rPr lang="en-US" dirty="0" smtClean="0"/>
+              <a:t>Less testing/fixing</a:t>
+            </a:r>
+          </a:p>
+          <a:p>
+            <a:pPr lvl="2"/>
+            <a:r>
+              <a:rPr lang="en-US" dirty="0" smtClean="0">
+                <a:solidFill>
+                  <a:srgbClr val="FFFF00"/>
+                </a:solidFill>
+              </a:rPr>
+              <a:t>Faster dev time</a:t>
+            </a:r>
+          </a:p>
+          <a:p>
+            <a:pPr lvl="1"/>
+            <a:r>
+              <a:rPr lang="en-US" dirty="0" smtClean="0"/>
+              <a:t>Less bugs in prod</a:t>
+            </a:r>
+          </a:p>
+        </p:txBody>
+      </p:sp>
+    </p:spTree>
+    <p:extLst>
+      <p:ext uri="{BB962C8B-B14F-4D97-AF65-F5344CB8AC3E}">
+        <p14:creationId xmlns:p14="http://schemas.microsoft.com/office/powerpoint/2010/main" val="1261155027"/>
+      </p:ext>
+    </p:extLst>
+  </p:cSld>
+  <p:clrMapOvr>
+    <a:masterClrMapping/>
+  </p:clrMapOvr>
+  <p:timing>
+    <p:tnLst>
+      <p:par>
+        <p:cTn id="1" dur="indefinite" restart="never" nodeType="tmRoot"/>
+      </p:par>
+    </p:tnLst>
+  </p:timing>
+</p:sld>
+</file>
+
+<file path=ppt/slides/slide12.xml><?xml version="1.0" encoding="utf-8"?>
+<p:sld xmlns:a="http://schemas.openxmlformats.org/drawingml/2006/main" xmlns:r="http://schemas.openxmlformats.org/officeDocument/2006/relationships" xmlns:p="http://schemas.openxmlformats.org/presentationml/2006/main">
+  <p:cSld>
+    <p:spTree>
+      <p:nvGrpSpPr>
+        <p:cNvPr id="1" name=""/>
+        <p:cNvGrpSpPr/>
+        <p:nvPr/>
+      </p:nvGrpSpPr>
+      <p:grpSpPr>
+        <a:xfrm>
+          <a:off x="0" y="0"/>
+          <a:ext cx="0" cy="0"/>
+          <a:chOff x="0" y="0"/>
+          <a:chExt cx="0" cy="0"/>
+        </a:xfrm>
+      </p:grpSpPr>
+      <p:sp>
+        <p:nvSpPr>
+          <p:cNvPr id="2" name="Title 1"/>
+          <p:cNvSpPr>
+            <a:spLocks noGrp="1"/>
+          </p:cNvSpPr>
+          <p:nvPr>
+            <p:ph type="title"/>
+          </p:nvPr>
+        </p:nvSpPr>
+        <p:spPr/>
+        <p:txBody>
+          <a:bodyPr/>
+          <a:lstStyle/>
+          <a:p>
+            <a:r>
+              <a:rPr lang="en-US" dirty="0" smtClean="0"/>
+              <a:t>Next Steps?</a:t>
+            </a:r>
+            <a:endParaRPr lang="en-US" dirty="0"/>
+          </a:p>
+        </p:txBody>
+      </p:sp>
+      <p:sp>
+        <p:nvSpPr>
+          <p:cNvPr id="3" name="Content Placeholder 2"/>
+          <p:cNvSpPr>
+            <a:spLocks noGrp="1"/>
+          </p:cNvSpPr>
+          <p:nvPr>
+            <p:ph idx="1"/>
+          </p:nvPr>
+        </p:nvSpPr>
+        <p:spPr/>
+        <p:txBody>
+          <a:bodyPr/>
+          <a:lstStyle/>
+          <a:p>
+            <a:r>
+              <a:rPr lang="en-US" dirty="0" smtClean="0"/>
+              <a:t>Start building data imports in F#</a:t>
+            </a:r>
+          </a:p>
+          <a:p>
+            <a:endParaRPr lang="en-US" dirty="0"/>
+          </a:p>
+          <a:p>
+            <a:r>
+              <a:rPr lang="en-US" dirty="0" smtClean="0"/>
+              <a:t>Support dashboard</a:t>
+            </a:r>
+          </a:p>
+          <a:p>
+            <a:pPr lvl="1"/>
+            <a:r>
+              <a:rPr lang="en-US" dirty="0" smtClean="0"/>
+              <a:t>Fable</a:t>
+            </a:r>
+          </a:p>
+          <a:p>
+            <a:pPr lvl="2"/>
+            <a:r>
+              <a:rPr lang="en-US" dirty="0" smtClean="0"/>
+              <a:t>Compiles F# into Node.JS</a:t>
+            </a:r>
+          </a:p>
+          <a:p>
+            <a:pPr lvl="2"/>
+            <a:r>
+              <a:rPr lang="en-US" dirty="0" smtClean="0"/>
+              <a:t>Same language on front/back end</a:t>
+            </a:r>
+          </a:p>
+          <a:p>
+            <a:pPr lvl="1"/>
+            <a:r>
+              <a:rPr lang="en-US" dirty="0" smtClean="0">
+                <a:solidFill>
+                  <a:srgbClr val="FFFF00"/>
+                </a:solidFill>
+              </a:rPr>
+              <a:t>Full stack developer</a:t>
+            </a:r>
+          </a:p>
+          <a:p>
+            <a:pPr lvl="1"/>
+            <a:r>
+              <a:rPr lang="en-US" dirty="0" smtClean="0">
+                <a:solidFill>
+                  <a:srgbClr val="FFFF00"/>
+                </a:solidFill>
+              </a:rPr>
+              <a:t>Design/UX</a:t>
+            </a:r>
+            <a:endParaRPr lang="en-US" dirty="0">
+              <a:solidFill>
+                <a:srgbClr val="FFFF00"/>
+              </a:solidFill>
+            </a:endParaRPr>
+          </a:p>
+        </p:txBody>
+      </p:sp>
+    </p:spTree>
+    <p:extLst>
+      <p:ext uri="{BB962C8B-B14F-4D97-AF65-F5344CB8AC3E}">
+        <p14:creationId xmlns:p14="http://schemas.microsoft.com/office/powerpoint/2010/main" val="3766803100"/>
+      </p:ext>
+    </p:extLst>
+  </p:cSld>
+  <p:clrMapOvr>
+    <a:masterClrMapping/>
+  </p:clrMapOvr>
+  <p:timing>
+    <p:tnLst>
+      <p:par>
+        <p:cTn id="1" dur="indefinite" restart="never" nodeType="tmRoot"/>
+      </p:par>
+    </p:tnLst>
+  </p:timing>
+</p:sld>
+</file>
+
 <file path=ppt/slides/slide2.xml><?xml version="1.0" encoding="utf-8"?>
 <p:sld xmlns:a="http://schemas.openxmlformats.org/drawingml/2006/main" xmlns:r="http://schemas.openxmlformats.org/officeDocument/2006/relationships" xmlns:p="http://schemas.openxmlformats.org/presentationml/2006/main">
   <p:cSld>
@@ -3574,14 +4186,14 @@
             <a:pPr lvl="2"/>
             <a:r>
               <a:rPr lang="en-US" dirty="0" smtClean="0"/>
+              <a:t>Hard to find edge cases</a:t>
+            </a:r>
+          </a:p>
+          <a:p>
+            <a:pPr lvl="2"/>
+            <a:r>
+              <a:rPr lang="en-US" dirty="0" smtClean="0"/>
               <a:t>Hard to estimate</a:t>
-            </a:r>
-          </a:p>
-          <a:p>
-            <a:pPr lvl="2"/>
-            <a:r>
-              <a:rPr lang="en-US" dirty="0" smtClean="0"/>
-              <a:t>Tiring</a:t>
             </a:r>
           </a:p>
           <a:p>
@@ -5896,8 +6508,8 @@
         </p:nvSpPr>
         <p:spPr>
           <a:xfrm>
-            <a:off x="6405155" y="424543"/>
-            <a:ext cx="5066211" cy="6167891"/>
+            <a:off x="6405155" y="78377"/>
+            <a:ext cx="5066211" cy="6727372"/>
           </a:xfrm>
           <a:prstGeom prst="rect">
             <a:avLst/>
@@ -5905,7 +6517,7 @@
         </p:spPr>
         <p:txBody>
           <a:bodyPr vert="horz" lIns="91440" tIns="45720" rIns="91440" bIns="45720" rtlCol="0">
-            <a:normAutofit/>
+            <a:normAutofit fontScale="92500"/>
           </a:bodyPr>
           <a:lstStyle>
             <a:lvl1pPr marL="228600" indent="-228600" algn="l" defTabSz="914400" rtl="0" eaLnBrk="1" latinLnBrk="0" hangingPunct="1">
@@ -6120,8 +6732,42 @@
             <a:pPr lvl="1"/>
             <a:r>
               <a:rPr lang="en-US" dirty="0" smtClean="0"/>
-              <a:t>Return delta and update list in side effect layer</a:t>
-            </a:r>
+              <a:t>Return delta and update list in side effect </a:t>
+            </a:r>
+            <a:r>
+              <a:rPr lang="en-US" dirty="0" smtClean="0"/>
+              <a:t>layer</a:t>
+            </a:r>
+          </a:p>
+          <a:p>
+            <a:pPr lvl="1"/>
+            <a:r>
+              <a:rPr lang="en-US" dirty="0" smtClean="0"/>
+              <a:t>Break into sub-objects</a:t>
+            </a:r>
+          </a:p>
+          <a:p>
+            <a:pPr lvl="2"/>
+            <a:r>
+              <a:rPr lang="en-US" dirty="0" smtClean="0"/>
+              <a:t>Customer</a:t>
+            </a:r>
+          </a:p>
+          <a:p>
+            <a:pPr lvl="3"/>
+            <a:r>
+              <a:rPr lang="en-US" dirty="0" err="1" smtClean="0"/>
+              <a:t>NameInfo</a:t>
+            </a:r>
+            <a:endParaRPr lang="en-US" dirty="0" smtClean="0"/>
+          </a:p>
+          <a:p>
+            <a:pPr lvl="3"/>
+            <a:r>
+              <a:rPr lang="en-US" dirty="0" err="1" smtClean="0"/>
+              <a:t>AddressInfo</a:t>
+            </a:r>
+            <a:endParaRPr lang="en-US" dirty="0" smtClean="0"/>
           </a:p>
           <a:p>
             <a:pPr lvl="1"/>
@@ -6523,6 +7169,130 @@
                                   </p:childTnLst>
                                 </p:cTn>
                               </p:par>
+                              <p:par>
+                                <p:cTn id="29" presetID="1" presetClass="entr" presetSubtype="0" fill="hold" nodeType="withEffect">
+                                  <p:stCondLst>
+                                    <p:cond delay="0"/>
+                                  </p:stCondLst>
+                                  <p:childTnLst>
+                                    <p:set>
+                                      <p:cBhvr>
+                                        <p:cTn id="30" dur="1" fill="hold">
+                                          <p:stCondLst>
+                                            <p:cond delay="0"/>
+                                          </p:stCondLst>
+                                        </p:cTn>
+                                        <p:tgtEl>
+                                          <p:spTgt spid="4">
+                                            <p:txEl>
+                                              <p:pRg st="12" end="12"/>
+                                            </p:txEl>
+                                          </p:spTgt>
+                                        </p:tgtEl>
+                                        <p:attrNameLst>
+                                          <p:attrName>style.visibility</p:attrName>
+                                        </p:attrNameLst>
+                                      </p:cBhvr>
+                                      <p:to>
+                                        <p:strVal val="visible"/>
+                                      </p:to>
+                                    </p:set>
+                                  </p:childTnLst>
+                                </p:cTn>
+                              </p:par>
+                              <p:par>
+                                <p:cTn id="31" presetID="1" presetClass="entr" presetSubtype="0" fill="hold" nodeType="withEffect">
+                                  <p:stCondLst>
+                                    <p:cond delay="0"/>
+                                  </p:stCondLst>
+                                  <p:childTnLst>
+                                    <p:set>
+                                      <p:cBhvr>
+                                        <p:cTn id="32" dur="1" fill="hold">
+                                          <p:stCondLst>
+                                            <p:cond delay="0"/>
+                                          </p:stCondLst>
+                                        </p:cTn>
+                                        <p:tgtEl>
+                                          <p:spTgt spid="4">
+                                            <p:txEl>
+                                              <p:pRg st="13" end="13"/>
+                                            </p:txEl>
+                                          </p:spTgt>
+                                        </p:tgtEl>
+                                        <p:attrNameLst>
+                                          <p:attrName>style.visibility</p:attrName>
+                                        </p:attrNameLst>
+                                      </p:cBhvr>
+                                      <p:to>
+                                        <p:strVal val="visible"/>
+                                      </p:to>
+                                    </p:set>
+                                  </p:childTnLst>
+                                </p:cTn>
+                              </p:par>
+                              <p:par>
+                                <p:cTn id="33" presetID="1" presetClass="entr" presetSubtype="0" fill="hold" nodeType="withEffect">
+                                  <p:stCondLst>
+                                    <p:cond delay="0"/>
+                                  </p:stCondLst>
+                                  <p:childTnLst>
+                                    <p:set>
+                                      <p:cBhvr>
+                                        <p:cTn id="34" dur="1" fill="hold">
+                                          <p:stCondLst>
+                                            <p:cond delay="0"/>
+                                          </p:stCondLst>
+                                        </p:cTn>
+                                        <p:tgtEl>
+                                          <p:spTgt spid="4">
+                                            <p:txEl>
+                                              <p:pRg st="14" end="14"/>
+                                            </p:txEl>
+                                          </p:spTgt>
+                                        </p:tgtEl>
+                                        <p:attrNameLst>
+                                          <p:attrName>style.visibility</p:attrName>
+                                        </p:attrNameLst>
+                                      </p:cBhvr>
+                                      <p:to>
+                                        <p:strVal val="visible"/>
+                                      </p:to>
+                                    </p:set>
+                                  </p:childTnLst>
+                                </p:cTn>
+                              </p:par>
+                              <p:par>
+                                <p:cTn id="35" presetID="1" presetClass="entr" presetSubtype="0" fill="hold" nodeType="withEffect">
+                                  <p:stCondLst>
+                                    <p:cond delay="0"/>
+                                  </p:stCondLst>
+                                  <p:childTnLst>
+                                    <p:set>
+                                      <p:cBhvr>
+                                        <p:cTn id="36" dur="1" fill="hold">
+                                          <p:stCondLst>
+                                            <p:cond delay="0"/>
+                                          </p:stCondLst>
+                                        </p:cTn>
+                                        <p:tgtEl>
+                                          <p:spTgt spid="4">
+                                            <p:txEl>
+                                              <p:pRg st="15" end="15"/>
+                                            </p:txEl>
+                                          </p:spTgt>
+                                        </p:tgtEl>
+                                        <p:attrNameLst>
+                                          <p:attrName>style.visibility</p:attrName>
+                                        </p:attrNameLst>
+                                      </p:cBhvr>
+                                      <p:to>
+                                        <p:strVal val="visible"/>
+                                      </p:to>
+                                    </p:set>
+                                  </p:childTnLst>
+                                </p:cTn>
+                              </p:par>
                             </p:childTnLst>
                           </p:cTn>
                         </p:par>
@@ -6555,6 +7325,192 @@
 </file>
 
 <file path=ppt/slides/slide7.xml><?xml version="1.0" encoding="utf-8"?>
+<p:sld xmlns:a="http://schemas.openxmlformats.org/drawingml/2006/main" xmlns:r="http://schemas.openxmlformats.org/officeDocument/2006/relationships" xmlns:p="http://schemas.openxmlformats.org/presentationml/2006/main">
+  <p:cSld>
+    <p:spTree>
+      <p:nvGrpSpPr>
+        <p:cNvPr id="1" name=""/>
+        <p:cNvGrpSpPr/>
+        <p:nvPr/>
+      </p:nvGrpSpPr>
+      <p:grpSpPr>
+        <a:xfrm>
+          <a:off x="0" y="0"/>
+          <a:ext cx="0" cy="0"/>
+          <a:chOff x="0" y="0"/>
+          <a:chExt cx="0" cy="0"/>
+        </a:xfrm>
+      </p:grpSpPr>
+      <p:sp>
+        <p:nvSpPr>
+          <p:cNvPr id="2" name="Title 1"/>
+          <p:cNvSpPr>
+            <a:spLocks noGrp="1"/>
+          </p:cNvSpPr>
+          <p:nvPr>
+            <p:ph type="title"/>
+          </p:nvPr>
+        </p:nvSpPr>
+        <p:spPr/>
+        <p:txBody>
+          <a:bodyPr/>
+          <a:lstStyle/>
+          <a:p>
+            <a:r>
+              <a:rPr lang="en-US" dirty="0" smtClean="0"/>
+              <a:t>Would you rather?</a:t>
+            </a:r>
+            <a:endParaRPr lang="en-US" dirty="0"/>
+          </a:p>
+        </p:txBody>
+      </p:sp>
+      <p:sp>
+        <p:nvSpPr>
+          <p:cNvPr id="3" name="Content Placeholder 2"/>
+          <p:cNvSpPr>
+            <a:spLocks noGrp="1"/>
+          </p:cNvSpPr>
+          <p:nvPr>
+            <p:ph idx="1"/>
+          </p:nvPr>
+        </p:nvSpPr>
+        <p:spPr/>
+        <p:txBody>
+          <a:bodyPr/>
+          <a:lstStyle/>
+          <a:p>
+            <a:r>
+              <a:rPr lang="en-US" dirty="0" smtClean="0">
+                <a:solidFill>
+                  <a:srgbClr val="FF0000"/>
+                </a:solidFill>
+              </a:rPr>
+              <a:t>Fix a bug in prod?</a:t>
+            </a:r>
+          </a:p>
+          <a:p>
+            <a:endParaRPr lang="en-US" dirty="0"/>
+          </a:p>
+          <a:p>
+            <a:r>
+              <a:rPr lang="en-US" dirty="0" smtClean="0">
+                <a:solidFill>
+                  <a:schemeClr val="accent4">
+                    <a:lumMod val="60000"/>
+                    <a:lumOff val="40000"/>
+                  </a:schemeClr>
+                </a:solidFill>
+              </a:rPr>
+              <a:t>Fix a performance issue in prod?</a:t>
+            </a:r>
+          </a:p>
+          <a:p>
+            <a:pPr lvl="1"/>
+            <a:r>
+              <a:rPr lang="en-US" dirty="0" smtClean="0"/>
+              <a:t>Load test before prod</a:t>
+            </a:r>
+          </a:p>
+          <a:p>
+            <a:pPr lvl="1"/>
+            <a:r>
+              <a:rPr lang="en-US" dirty="0" smtClean="0">
+                <a:solidFill>
+                  <a:schemeClr val="accent1">
+                    <a:lumMod val="60000"/>
+                    <a:lumOff val="40000"/>
+                  </a:schemeClr>
+                </a:solidFill>
+              </a:rPr>
+              <a:t>Throughput</a:t>
+            </a:r>
+            <a:r>
+              <a:rPr lang="en-US" dirty="0" smtClean="0"/>
+              <a:t> &lt;&gt; </a:t>
+            </a:r>
+            <a:r>
+              <a:rPr lang="en-US" dirty="0" smtClean="0">
+                <a:solidFill>
+                  <a:schemeClr val="accent5">
+                    <a:lumMod val="60000"/>
+                    <a:lumOff val="40000"/>
+                  </a:schemeClr>
+                </a:solidFill>
+              </a:rPr>
+              <a:t>performance</a:t>
+            </a:r>
+          </a:p>
+          <a:p>
+            <a:pPr lvl="2"/>
+            <a:r>
+              <a:rPr lang="en-US" dirty="0" smtClean="0"/>
+              <a:t>Parallel processing</a:t>
+            </a:r>
+          </a:p>
+          <a:p>
+            <a:pPr lvl="2"/>
+            <a:endParaRPr lang="en-US" dirty="0"/>
+          </a:p>
+          <a:p>
+            <a:pPr lvl="1"/>
+            <a:r>
+              <a:rPr lang="en-US" dirty="0" smtClean="0">
+                <a:solidFill>
+                  <a:schemeClr val="accent1">
+                    <a:lumMod val="60000"/>
+                    <a:lumOff val="40000"/>
+                  </a:schemeClr>
+                </a:solidFill>
+              </a:rPr>
+              <a:t>How many records per second </a:t>
+            </a:r>
+            <a:r>
+              <a:rPr lang="en-US" dirty="0" smtClean="0"/>
+              <a:t>&lt;&gt; </a:t>
+            </a:r>
+            <a:r>
+              <a:rPr lang="en-US" dirty="0" smtClean="0">
+                <a:solidFill>
+                  <a:schemeClr val="accent5">
+                    <a:lumMod val="60000"/>
+                    <a:lumOff val="40000"/>
+                  </a:schemeClr>
+                </a:solidFill>
+              </a:rPr>
+              <a:t>how many seconds for an individual record</a:t>
+            </a:r>
+            <a:endParaRPr lang="en-US" dirty="0">
+              <a:solidFill>
+                <a:schemeClr val="accent5">
+                  <a:lumMod val="60000"/>
+                  <a:lumOff val="40000"/>
+                </a:schemeClr>
+              </a:solidFill>
+            </a:endParaRPr>
+          </a:p>
+        </p:txBody>
+      </p:sp>
+    </p:spTree>
+    <p:extLst>
+      <p:ext uri="{BB962C8B-B14F-4D97-AF65-F5344CB8AC3E}">
+        <p14:creationId xmlns:p14="http://schemas.microsoft.com/office/powerpoint/2010/main" val="2335820934"/>
+      </p:ext>
+    </p:extLst>
+  </p:cSld>
+  <p:clrMapOvr>
+    <a:masterClrMapping/>
+  </p:clrMapOvr>
+  <p:timing>
+    <p:tnLst>
+      <p:par>
+        <p:cTn id="1" dur="indefinite" restart="never" nodeType="tmRoot"/>
+      </p:par>
+    </p:tnLst>
+  </p:timing>
+</p:sld>
+</file>
+
+<file path=ppt/slides/slide8.xml><?xml version="1.0" encoding="utf-8"?>
 <p:sld xmlns:a="http://schemas.openxmlformats.org/drawingml/2006/main" xmlns:r="http://schemas.openxmlformats.org/officeDocument/2006/relationships" xmlns:p="http://schemas.openxmlformats.org/presentationml/2006/main">
   <p:cSld>
     <p:spTree>
@@ -6675,7 +7631,7 @@
         <p:spPr>
           <a:xfrm>
             <a:off x="195944" y="1570201"/>
-            <a:ext cx="5310050" cy="1200329"/>
+            <a:ext cx="6159136" cy="1200329"/>
           </a:xfrm>
           <a:prstGeom prst="rect">
             <a:avLst/>
@@ -6694,7 +7650,7 @@
             </a:pPr>
             <a:r>
               <a:rPr lang="en-US" sz="2400" dirty="0" smtClean="0"/>
-              <a:t>So far, no bugs in F# code</a:t>
+              <a:t>So far, 1 bug in F# code</a:t>
             </a:r>
           </a:p>
           <a:p>
@@ -6704,7 +7660,7 @@
             </a:pPr>
             <a:r>
               <a:rPr lang="en-US" sz="2400" dirty="0" smtClean="0"/>
-              <a:t>Zero incorrect behavior</a:t>
+              <a:t>Wrong value in hardcoded string</a:t>
             </a:r>
           </a:p>
           <a:p>
@@ -6713,10 +7669,18 @@
               <a:buChar char="•"/>
             </a:pPr>
             <a:r>
-              <a:rPr lang="en-US" sz="2400" dirty="0" smtClean="0"/>
-              <a:t>Zero runtime errors</a:t>
-            </a:r>
-            <a:endParaRPr lang="en-US" sz="2400" dirty="0"/>
+              <a:rPr lang="en-US" sz="2400" dirty="0" smtClean="0">
+                <a:solidFill>
+                  <a:srgbClr val="FF0000"/>
+                </a:solidFill>
+              </a:rPr>
+              <a:t>Bad data</a:t>
+            </a:r>
+            <a:endParaRPr lang="en-US" sz="2400" dirty="0">
+              <a:solidFill>
+                <a:srgbClr val="FF0000"/>
+              </a:solidFill>
+            </a:endParaRPr>
           </a:p>
         </p:txBody>
       </p:sp>
@@ -6805,6 +7769,108 @@
               <a:t>Improved log messages</a:t>
             </a:r>
             <a:endParaRPr lang="en-US" sz="2400" dirty="0"/>
+          </a:p>
+        </p:txBody>
+      </p:sp>
+      <p:sp>
+        <p:nvSpPr>
+          <p:cNvPr id="3" name="TextBox 2"/>
+          <p:cNvSpPr txBox="1"/>
+          <p:nvPr/>
+        </p:nvSpPr>
+        <p:spPr>
+          <a:xfrm>
+            <a:off x="10110651" y="3572673"/>
+            <a:ext cx="1972492" cy="369332"/>
+          </a:xfrm>
+          <a:prstGeom prst="rect">
+            <a:avLst/>
+          </a:prstGeom>
+          <a:noFill/>
+        </p:spPr>
+        <p:txBody>
+          <a:bodyPr wrap="square" rtlCol="0">
+            <a:spAutoFit/>
+          </a:bodyPr>
+          <a:lstStyle/>
+          <a:p>
+            <a:r>
+              <a:rPr lang="en-US" dirty="0" smtClean="0">
+                <a:solidFill>
+                  <a:srgbClr val="FF0000"/>
+                </a:solidFill>
+              </a:rPr>
+              <a:t>HAPPY PATH</a:t>
+            </a:r>
+            <a:endParaRPr lang="en-US" dirty="0">
+              <a:solidFill>
+                <a:srgbClr val="FF0000"/>
+              </a:solidFill>
+            </a:endParaRPr>
+          </a:p>
+        </p:txBody>
+      </p:sp>
+      <p:sp>
+        <p:nvSpPr>
+          <p:cNvPr id="5" name="TextBox 4"/>
+          <p:cNvSpPr txBox="1"/>
+          <p:nvPr/>
+        </p:nvSpPr>
+        <p:spPr>
+          <a:xfrm>
+            <a:off x="6211388" y="1344238"/>
+            <a:ext cx="5142412" cy="830997"/>
+          </a:xfrm>
+          <a:prstGeom prst="rect">
+            <a:avLst/>
+          </a:prstGeom>
+          <a:noFill/>
+        </p:spPr>
+        <p:txBody>
+          <a:bodyPr wrap="square" rtlCol="0">
+            <a:spAutoFit/>
+          </a:bodyPr>
+          <a:lstStyle/>
+          <a:p>
+            <a:pPr marL="285750" indent="-285750">
+              <a:buFont typeface="Arial" panose="020B0604020202020204" pitchFamily="34" charset="0"/>
+              <a:buChar char="•"/>
+            </a:pPr>
+            <a:r>
+              <a:rPr lang="en-US" sz="2400" dirty="0" smtClean="0">
+                <a:solidFill>
+                  <a:srgbClr val="FFFF00"/>
+                </a:solidFill>
+              </a:rPr>
+              <a:t>C#</a:t>
+            </a:r>
+          </a:p>
+          <a:p>
+            <a:pPr marL="742950" lvl="1" indent="-285750">
+              <a:buFont typeface="Arial" panose="020B0604020202020204" pitchFamily="34" charset="0"/>
+              <a:buChar char="•"/>
+            </a:pPr>
+            <a:r>
+              <a:rPr lang="en-US" sz="2400" dirty="0" err="1" smtClean="0">
+                <a:solidFill>
+                  <a:srgbClr val="FFFF00"/>
+                </a:solidFill>
+              </a:rPr>
+              <a:t>NotImplementedException</a:t>
+            </a:r>
+            <a:r>
+              <a:rPr lang="en-US" sz="2400" dirty="0" smtClean="0">
+                <a:solidFill>
+                  <a:srgbClr val="FFFF00"/>
+                </a:solidFill>
+              </a:rPr>
+              <a:t> x 10</a:t>
+            </a:r>
+            <a:endParaRPr lang="en-US" sz="2400" dirty="0">
+              <a:solidFill>
+                <a:srgbClr val="FFFF00"/>
+              </a:solidFill>
+            </a:endParaRPr>
           </a:p>
         </p:txBody>
       </p:sp>
@@ -6897,7 +7963,7 @@
                                           </p:stCondLst>
                                         </p:cTn>
                                         <p:tgtEl>
-                                          <p:spTgt spid="9"/>
+                                          <p:spTgt spid="5"/>
                                         </p:tgtEl>
                                         <p:attrNameLst>
                                           <p:attrName>style.visibility</p:attrName>
@@ -6937,6 +8003,51 @@
                                     <p:set>
                                       <p:cBhvr>
                                         <p:cTn id="14" dur="1" fill="hold">
+                                          <p:stCondLst>
+                                            <p:cond delay="0"/>
+                                          </p:stCondLst>
+                                        </p:cTn>
+                                        <p:tgtEl>
+                                          <p:spTgt spid="9"/>
+                                        </p:tgtEl>
+                                        <p:attrNameLst>
+                                          <p:attrName>style.visibility</p:attrName>
+                                        </p:attrNameLst>
+                                      </p:cBhvr>
+                                      <p:to>
+                                        <p:strVal val="visible"/>
+                                      </p:to>
+                                    </p:set>
+                                  </p:childTnLst>
+                                </p:cTn>
+                              </p:par>
+                            </p:childTnLst>
+                          </p:cTn>
+                        </p:par>
+                      </p:childTnLst>
+                    </p:cTn>
+                  </p:par>
+                  <p:par>
+                    <p:cTn id="15" fill="hold">
+                      <p:stCondLst>
+                        <p:cond delay="indefinite"/>
+                      </p:stCondLst>
+                      <p:childTnLst>
+                        <p:par>
+                          <p:cTn id="16" fill="hold">
+                            <p:stCondLst>
+                              <p:cond delay="0"/>
+                            </p:stCondLst>
+                            <p:childTnLst>
+                              <p:par>
+                                <p:cTn id="17" presetID="1" presetClass="entr" presetSubtype="0" fill="hold" grpId="0" nodeType="clickEffect">
+                                  <p:stCondLst>
+                                    <p:cond delay="0"/>
+                                  </p:stCondLst>
+                                  <p:childTnLst>
+                                    <p:set>
+                                      <p:cBhvr>
+                                        <p:cTn id="18" dur="1" fill="hold">
                                           <p:stCondLst>
                                             <p:cond delay="0"/>
                                           </p:stCondLst>
@@ -6986,171 +8097,8 @@
       <p:bldP spid="8" grpId="0"/>
       <p:bldP spid="9" grpId="0"/>
       <p:bldP spid="10" grpId="0"/>
+      <p:bldP spid="5" grpId="0"/>
     </p:bldLst>
-  </p:timing>
-</p:sld>
-</file>
-
-<file path=ppt/slides/slide8.xml><?xml version="1.0" encoding="utf-8"?>
-<p:sld xmlns:a="http://schemas.openxmlformats.org/drawingml/2006/main" xmlns:r="http://schemas.openxmlformats.org/officeDocument/2006/relationships" xmlns:p="http://schemas.openxmlformats.org/presentationml/2006/main">
-  <p:cSld>
-    <p:spTree>
-      <p:nvGrpSpPr>
-        <p:cNvPr id="1" name=""/>
-        <p:cNvGrpSpPr/>
-        <p:nvPr/>
-      </p:nvGrpSpPr>
-      <p:grpSpPr>
-        <a:xfrm>
-          <a:off x="0" y="0"/>
-          <a:ext cx="0" cy="0"/>
-          <a:chOff x="0" y="0"/>
-          <a:chExt cx="0" cy="0"/>
-        </a:xfrm>
-      </p:grpSpPr>
-      <p:sp>
-        <p:nvSpPr>
-          <p:cNvPr id="2" name="Title 1"/>
-          <p:cNvSpPr>
-            <a:spLocks noGrp="1"/>
-          </p:cNvSpPr>
-          <p:nvPr>
-            <p:ph type="title"/>
-          </p:nvPr>
-        </p:nvSpPr>
-        <p:spPr/>
-        <p:txBody>
-          <a:bodyPr/>
-          <a:lstStyle/>
-          <a:p>
-            <a:r>
-              <a:rPr lang="en-US" dirty="0" smtClean="0"/>
-              <a:t>Completed work</a:t>
-            </a:r>
-            <a:endParaRPr lang="en-US" dirty="0"/>
-          </a:p>
-        </p:txBody>
-      </p:sp>
-      <p:sp>
-        <p:nvSpPr>
-          <p:cNvPr id="3" name="Content Placeholder 2"/>
-          <p:cNvSpPr>
-            <a:spLocks noGrp="1"/>
-          </p:cNvSpPr>
-          <p:nvPr>
-            <p:ph idx="1"/>
-          </p:nvPr>
-        </p:nvSpPr>
-        <p:spPr>
-          <a:xfrm>
-            <a:off x="838200" y="1825624"/>
-            <a:ext cx="10515600" cy="5092887"/>
-          </a:xfrm>
-        </p:spPr>
-        <p:txBody>
-          <a:bodyPr/>
-          <a:lstStyle/>
-          <a:p>
-            <a:r>
-              <a:rPr lang="en-US" dirty="0" smtClean="0"/>
-              <a:t>Selecting from input</a:t>
-            </a:r>
-          </a:p>
-          <a:p>
-            <a:pPr lvl="1"/>
-            <a:r>
-              <a:rPr lang="en-US" dirty="0" smtClean="0"/>
-              <a:t>Multiple instances with atomic select-update</a:t>
-            </a:r>
-          </a:p>
-          <a:p>
-            <a:pPr lvl="1"/>
-            <a:r>
-              <a:rPr lang="en-US" dirty="0" smtClean="0"/>
-              <a:t>Load test ensures input records are not handled twice</a:t>
-            </a:r>
-          </a:p>
-          <a:p>
-            <a:r>
-              <a:rPr lang="en-US" dirty="0" smtClean="0"/>
-              <a:t>Writing to output</a:t>
-            </a:r>
-          </a:p>
-          <a:p>
-            <a:pPr lvl="1"/>
-            <a:r>
-              <a:rPr lang="en-US" dirty="0" smtClean="0"/>
-              <a:t>Updates – working</a:t>
-            </a:r>
-          </a:p>
-          <a:p>
-            <a:pPr lvl="1"/>
-            <a:r>
-              <a:rPr lang="en-US" dirty="0" smtClean="0"/>
-              <a:t>Insert – edge case</a:t>
-            </a:r>
-          </a:p>
-          <a:p>
-            <a:pPr lvl="2"/>
-            <a:r>
-              <a:rPr lang="en-US" dirty="0" smtClean="0"/>
-              <a:t>Existing DB does not have PK auto increment</a:t>
-            </a:r>
-          </a:p>
-          <a:p>
-            <a:pPr lvl="2"/>
-            <a:r>
-              <a:rPr lang="en-US" dirty="0"/>
-              <a:t>PK collision</a:t>
-            </a:r>
-          </a:p>
-          <a:p>
-            <a:pPr lvl="3"/>
-            <a:r>
-              <a:rPr lang="en-US" dirty="0" smtClean="0"/>
-              <a:t>Detecting and logging</a:t>
-            </a:r>
-          </a:p>
-          <a:p>
-            <a:pPr lvl="3"/>
-            <a:r>
-              <a:rPr lang="en-US" dirty="0" smtClean="0"/>
-              <a:t>Planning to retry these</a:t>
-            </a:r>
-          </a:p>
-          <a:p>
-            <a:pPr lvl="4"/>
-            <a:r>
-              <a:rPr lang="en-US" dirty="0" smtClean="0">
-                <a:solidFill>
-                  <a:srgbClr val="FFFF00"/>
-                </a:solidFill>
-              </a:rPr>
-              <a:t>Limiting scope</a:t>
-            </a:r>
-          </a:p>
-          <a:p>
-            <a:pPr lvl="2"/>
-            <a:endParaRPr lang="en-US" dirty="0" smtClean="0"/>
-          </a:p>
-        </p:txBody>
-      </p:sp>
-    </p:spTree>
-    <p:extLst>
-      <p:ext uri="{BB962C8B-B14F-4D97-AF65-F5344CB8AC3E}">
-        <p14:creationId xmlns:p14="http://schemas.microsoft.com/office/powerpoint/2010/main" val="2111605369"/>
-      </p:ext>
-    </p:extLst>
-  </p:cSld>
-  <p:clrMapOvr>
-    <a:masterClrMapping/>
-  </p:clrMapOvr>
-  <p:timing>
-    <p:tnLst>
-      <p:par>
-        <p:cTn id="1" dur="indefinite" restart="never" nodeType="tmRoot"/>
-      </p:par>
-    </p:tnLst>
   </p:timing>
 </p:sld>
 </file>
@@ -7189,7 +8137,7 @@
           <a:p>
             <a:r>
               <a:rPr lang="en-US" dirty="0" smtClean="0"/>
-              <a:t>Features coming soon</a:t>
+              <a:t>Completed work</a:t>
             </a:r>
             <a:endParaRPr lang="en-US" dirty="0"/>
           </a:p>
@@ -7207,8 +8155,8 @@
         </p:nvSpPr>
         <p:spPr>
           <a:xfrm>
-            <a:off x="838200" y="1825625"/>
-            <a:ext cx="10515600" cy="4953998"/>
+            <a:off x="838200" y="1825624"/>
+            <a:ext cx="10515600" cy="5092887"/>
           </a:xfrm>
         </p:spPr>
         <p:txBody>
@@ -7217,75 +8165,152 @@
           <a:p>
             <a:r>
               <a:rPr lang="en-US" dirty="0" smtClean="0"/>
-              <a:t>Update status of input records</a:t>
+              <a:t>Selecting from input</a:t>
             </a:r>
           </a:p>
           <a:p>
             <a:pPr lvl="1"/>
             <a:r>
               <a:rPr lang="en-US" dirty="0" smtClean="0"/>
-              <a:t>Delete successful records</a:t>
+              <a:t>Multiple instances with atomic select-update</a:t>
             </a:r>
           </a:p>
           <a:p>
             <a:pPr lvl="1"/>
             <a:r>
               <a:rPr lang="en-US" dirty="0" smtClean="0"/>
-              <a:t>Mark as failed if failed</a:t>
+              <a:t>Load test ensures input records are not handled twice</a:t>
+            </a:r>
+          </a:p>
+          <a:p>
+            <a:r>
+              <a:rPr lang="en-US" dirty="0" smtClean="0"/>
+              <a:t>Writing to output</a:t>
             </a:r>
           </a:p>
           <a:p>
             <a:pPr lvl="1"/>
             <a:r>
               <a:rPr lang="en-US" dirty="0" smtClean="0"/>
-              <a:t>Retry PK collisions</a:t>
-            </a:r>
-          </a:p>
-          <a:p>
-            <a:r>
-              <a:rPr lang="en-US" dirty="0" smtClean="0"/>
-              <a:t>Log to DB instead of console</a:t>
-            </a:r>
-          </a:p>
-          <a:p>
-            <a:r>
-              <a:rPr lang="en-US" dirty="0" smtClean="0"/>
-              <a:t>Multiple threads</a:t>
-            </a:r>
-          </a:p>
-          <a:p>
-            <a:r>
-              <a:rPr lang="en-US" dirty="0" smtClean="0"/>
-              <a:t>Better load test</a:t>
+              <a:t>Updates – working</a:t>
             </a:r>
           </a:p>
           <a:p>
             <a:pPr lvl="1"/>
             <a:r>
               <a:rPr lang="en-US" dirty="0" smtClean="0"/>
-              <a:t>10 instances: don’t always get PK collision</a:t>
-            </a:r>
-          </a:p>
-          <a:p>
-            <a:pPr lvl="1"/>
-            <a:r>
-              <a:rPr lang="en-US" dirty="0" smtClean="0"/>
-              <a:t>20 instances: timeout when loading input</a:t>
-            </a:r>
-          </a:p>
-          <a:p>
-            <a:r>
-              <a:rPr lang="en-US" dirty="0" smtClean="0"/>
-              <a:t>Code cleanup</a:t>
-            </a:r>
-            <a:endParaRPr lang="en-US" dirty="0"/>
-          </a:p>
-        </p:txBody>
-      </p:sp>
+              <a:t>Insert – edge case</a:t>
+            </a:r>
+          </a:p>
+          <a:p>
+            <a:pPr lvl="2"/>
+            <a:r>
+              <a:rPr lang="en-US" dirty="0" smtClean="0"/>
+              <a:t>Existing DB does not have PK auto increment</a:t>
+            </a:r>
+          </a:p>
+          <a:p>
+            <a:pPr lvl="2"/>
+            <a:r>
+              <a:rPr lang="en-US" dirty="0"/>
+              <a:t>PK collision</a:t>
+            </a:r>
+          </a:p>
+          <a:p>
+            <a:pPr lvl="3"/>
+            <a:r>
+              <a:rPr lang="en-US" dirty="0" smtClean="0"/>
+              <a:t>Detecting and logging</a:t>
+            </a:r>
+          </a:p>
+          <a:p>
+            <a:pPr lvl="3"/>
+            <a:r>
+              <a:rPr lang="en-US" dirty="0" smtClean="0"/>
+              <a:t>Planning to retry these</a:t>
+            </a:r>
+          </a:p>
+          <a:p>
+            <a:pPr lvl="4"/>
+            <a:r>
+              <a:rPr lang="en-US" dirty="0" smtClean="0">
+                <a:solidFill>
+                  <a:srgbClr val="FFFF00"/>
+                </a:solidFill>
+              </a:rPr>
+              <a:t>Limiting scope</a:t>
+            </a:r>
+          </a:p>
+          <a:p>
+            <a:pPr lvl="2"/>
+            <a:endParaRPr lang="en-US" dirty="0" smtClean="0"/>
+          </a:p>
+        </p:txBody>
+      </p:sp>
+      <p:pic>
+        <p:nvPicPr>
+          <p:cNvPr id="4" name="Picture 3"/>
+          <p:cNvPicPr>
+            <a:picLocks noChangeAspect="1"/>
+          </p:cNvPicPr>
+          <p:nvPr/>
+        </p:nvPicPr>
+        <p:blipFill>
+          <a:blip r:embed="rId2"/>
+          <a:stretch>
+            <a:fillRect/>
+          </a:stretch>
+        </p:blipFill>
+        <p:spPr>
+          <a:xfrm>
+            <a:off x="7062608" y="3348302"/>
+            <a:ext cx="13079444" cy="6212556"/>
+          </a:xfrm>
+          <a:prstGeom prst="rect">
+            <a:avLst/>
+          </a:prstGeom>
+        </p:spPr>
+      </p:pic>
+      <p:cxnSp>
+        <p:nvCxnSpPr>
+          <p:cNvPr id="6" name="Straight Arrow Connector 5"/>
+          <p:cNvCxnSpPr/>
+          <p:nvPr/>
+        </p:nvCxnSpPr>
+        <p:spPr>
+          <a:xfrm>
+            <a:off x="11604813" y="3112994"/>
+            <a:ext cx="0" cy="1385047"/>
+          </a:xfrm>
+          <a:prstGeom prst="straightConnector1">
+            <a:avLst/>
+          </a:prstGeom>
+          <a:ln w="76200">
+            <a:solidFill>
+              <a:srgbClr val="FF0000"/>
+            </a:solidFill>
+            <a:tailEnd type="triangle"/>
+          </a:ln>
+        </p:spPr>
+        <p:style>
+          <a:lnRef idx="1">
+            <a:schemeClr val="accent1"/>
+          </a:lnRef>
+          <a:fillRef idx="0">
+            <a:schemeClr val="accent1"/>
+          </a:fillRef>
+          <a:effectRef idx="0">
+            <a:schemeClr val="accent1"/>
+          </a:effectRef>
+          <a:fontRef idx="minor">
+            <a:schemeClr val="tx1"/>
+          </a:fontRef>
+        </p:style>
+      </p:cxnSp>
     </p:spTree>
     <p:extLst>
       <p:ext uri="{BB962C8B-B14F-4D97-AF65-F5344CB8AC3E}">
-        <p14:creationId xmlns:p14="http://schemas.microsoft.com/office/powerpoint/2010/main" val="65708568"/>
+        <p14:creationId xmlns:p14="http://schemas.microsoft.com/office/powerpoint/2010/main" val="2111605369"/>
       </p:ext>
     </p:extLst>
   </p:cSld>
@@ -7295,7 +8320,102 @@
   <p:timing>
     <p:tnLst>
       <p:par>
-        <p:cTn id="1" dur="indefinite" restart="never" nodeType="tmRoot"/>
+        <p:cTn id="1" dur="indefinite" restart="never" nodeType="tmRoot">
+          <p:childTnLst>
+            <p:seq concurrent="1" nextAc="seek">
+              <p:cTn id="2" dur="indefinite" nodeType="mainSeq">
+                <p:childTnLst>
+                  <p:par>
+                    <p:cTn id="3" fill="hold">
+                      <p:stCondLst>
+                        <p:cond delay="indefinite"/>
+                      </p:stCondLst>
+                      <p:childTnLst>
+                        <p:par>
+                          <p:cTn id="4" fill="hold">
+                            <p:stCondLst>
+                              <p:cond delay="0"/>
+                            </p:stCondLst>
+                            <p:childTnLst>
+                              <p:par>
+                                <p:cTn id="5" presetID="1" presetClass="entr" presetSubtype="0" fill="hold" nodeType="clickEffect">
+                                  <p:stCondLst>
+                                    <p:cond delay="0"/>
+                                  </p:stCondLst>
+                                  <p:childTnLst>
+                                    <p:set>
+                                      <p:cBhvr>
+                                        <p:cTn id="6" dur="1" fill="hold">
+                                          <p:stCondLst>
+                                            <p:cond delay="0"/>
+                                          </p:stCondLst>
+                                        </p:cTn>
+                                        <p:tgtEl>
+                                          <p:spTgt spid="4"/>
+                                        </p:tgtEl>
+                                        <p:attrNameLst>
+                                          <p:attrName>style.visibility</p:attrName>
+                                        </p:attrNameLst>
+                                      </p:cBhvr>
+                                      <p:to>
+                                        <p:strVal val="visible"/>
+                                      </p:to>
+                                    </p:set>
+                                  </p:childTnLst>
+                                </p:cTn>
+                              </p:par>
+                              <p:par>
+                                <p:cTn id="7" presetID="1" presetClass="entr" presetSubtype="0" fill="hold" nodeType="withEffect">
+                                  <p:stCondLst>
+                                    <p:cond delay="0"/>
+                                  </p:stCondLst>
+                                  <p:childTnLst>
+                                    <p:set>
+                                      <p:cBhvr>
+                                        <p:cTn id="8" dur="1" fill="hold">
+                                          <p:stCondLst>
+                                            <p:cond delay="0"/>
+                                          </p:stCondLst>
+                                        </p:cTn>
+                                        <p:tgtEl>
+                                          <p:spTgt spid="6"/>
+                                        </p:tgtEl>
+                                        <p:attrNameLst>
+                                          <p:attrName>style.visibility</p:attrName>
+                                        </p:attrNameLst>
+                                      </p:cBhvr>
+                                      <p:to>
+                                        <p:strVal val="visible"/>
+                                      </p:to>
+                                    </p:set>
+                                  </p:childTnLst>
+                                </p:cTn>
+                              </p:par>
+                            </p:childTnLst>
+                          </p:cTn>
+                        </p:par>
+                      </p:childTnLst>
+                    </p:cTn>
+                  </p:par>
+                </p:childTnLst>
+              </p:cTn>
+              <p:prevCondLst>
+                <p:cond evt="onPrev" delay="0">
+                  <p:tgtEl>
+                    <p:sldTgt/>
+                  </p:tgtEl>
+                </p:cond>
+              </p:prevCondLst>
+              <p:nextCondLst>
+                <p:cond evt="onNext" delay="0">
+                  <p:tgtEl>
+                    <p:sldTgt/>
+                  </p:tgtEl>
+                </p:cond>
+              </p:nextCondLst>
+            </p:seq>
+          </p:childTnLst>
+        </p:cTn>
       </p:par>
     </p:tnLst>
   </p:timing>

</xml_diff>